<commit_message>
Answer to Q3 simplified, slide 16
</commit_message>
<xml_diff>
--- a/Slides-RPR/2019-H1-DAA-L26-Greedy-Algo-SSSP-Dijkstra.pptx
+++ b/Slides-RPR/2019-H1-DAA-L26-Greedy-Algo-SSSP-Dijkstra.pptx
@@ -5014,6 +5014,10 @@
           </p:nvPr>
         </p:nvSpPr>
         <p:spPr>
+          <a:xfrm>
+            <a:off x="666288" y="938113"/>
+            <a:ext cx="9264377" cy="5891610"/>
+          </a:xfrm>
           <a:prstGeom prst="rect">
             <a:avLst/>
           </a:prstGeom>
@@ -5037,7 +5041,7 @@
               <a:defRPr sz="2900"/>
             </a:pPr>
             <a:r>
-              <a:t>Ans:</a:t>
+              <a:t>Ans: Undirected graph</a:t>
             </a:r>
           </a:p>
           <a:p>
@@ -5048,292 +5052,82 @@
               <a:defRPr sz="2900"/>
             </a:pPr>
             <a:r>
-              <a:t>Instead of maintaining predecessor, keep succssor</a:t>
-            </a:r>
-          </a:p>
-          <a:p>
-            <a:pPr lvl="2" marL="0" indent="457200">
+              <a:t>Start from the destination vertex as source</a:t>
+            </a:r>
+          </a:p>
+          <a:p>
+            <a:pPr lvl="1" marL="671512" indent="-276225">
               <a:spcBef>
-                <a:spcPts val="200"/>
+                <a:spcPts val="700"/>
               </a:spcBef>
-              <a:buSzTx/>
-              <a:buNone/>
-              <a:defRPr>
-                <a:latin typeface="Courier New"/>
-                <a:ea typeface="Courier New"/>
-                <a:cs typeface="Courier New"/>
-                <a:sym typeface="Courier New"/>
-              </a:defRPr>
+              <a:defRPr sz="2900"/>
             </a:pPr>
             <a:r>
-              <a:rPr>
-                <a:latin typeface="Gill Sans MT"/>
-                <a:ea typeface="Gill Sans MT"/>
-                <a:cs typeface="Gill Sans MT"/>
-                <a:sym typeface="Gill Sans MT"/>
-              </a:rPr>
-              <a:t>for </a:t>
-            </a:r>
-            <a:r>
-              <a:t>i=0</a:t>
-            </a:r>
-            <a:r>
-              <a:rPr>
-                <a:latin typeface="Gill Sans MT"/>
-                <a:ea typeface="Gill Sans MT"/>
-                <a:cs typeface="Gill Sans MT"/>
-                <a:sym typeface="Gill Sans MT"/>
-              </a:rPr>
-              <a:t> to </a:t>
-            </a:r>
-            <a:r>
-              <a:t>|V|-1</a:t>
-            </a:r>
-            <a:r>
-              <a:rPr>
-                <a:latin typeface="Gill Sans MT"/>
-                <a:ea typeface="Gill Sans MT"/>
-                <a:cs typeface="Gill Sans MT"/>
-                <a:sym typeface="Gill Sans MT"/>
-              </a:rPr>
-              <a:t> do</a:t>
-            </a:r>
-          </a:p>
-          <a:p>
-            <a:pPr lvl="4" marL="0" indent="914400">
+              <a:t>Find the shortest path from this to all other vertices</a:t>
+            </a:r>
+          </a:p>
+          <a:p>
+            <a:pPr lvl="1" marL="671512" indent="-276225">
               <a:spcBef>
-                <a:spcPts val="200"/>
+                <a:spcPts val="700"/>
               </a:spcBef>
-              <a:buSzTx/>
-              <a:buNone/>
-              <a:defRPr>
-                <a:latin typeface="Courier New"/>
-                <a:ea typeface="Courier New"/>
-                <a:cs typeface="Courier New"/>
-                <a:sym typeface="Courier New"/>
-              </a:defRPr>
+              <a:defRPr sz="2900"/>
             </a:pPr>
             <a:r>
-              <a:t>select u as a destination</a:t>
-            </a:r>
-          </a:p>
-          <a:p>
-            <a:pPr lvl="4" marL="0" indent="914400">
+              <a:t>Reverse the path</a:t>
+            </a:r>
+          </a:p>
+          <a:p>
+            <a:pPr marL="350440" indent="-310753">
+              <a:defRPr sz="2900"/>
+            </a:pPr>
+            <a:r>
+              <a:t>Ans: directed graph</a:t>
+            </a:r>
+          </a:p>
+          <a:p>
+            <a:pPr lvl="1" marL="671512" indent="-276225">
               <a:spcBef>
-                <a:spcPts val="200"/>
+                <a:spcPts val="700"/>
               </a:spcBef>
-              <a:buSzTx/>
-              <a:buNone/>
-              <a:defRPr>
-                <a:latin typeface="Courier New"/>
-                <a:ea typeface="Courier New"/>
-                <a:cs typeface="Courier New"/>
-                <a:sym typeface="Courier New"/>
-              </a:defRPr>
+              <a:defRPr sz="2900"/>
             </a:pPr>
             <a:r>
-              <a:t>u</a:t>
-            </a:r>
-            <a:r>
-              <a:rPr>
-                <a:latin typeface="Gill Sans MT"/>
-                <a:ea typeface="Gill Sans MT"/>
-                <a:cs typeface="Gill Sans MT"/>
-                <a:sym typeface="Gill Sans MT"/>
-              </a:rPr>
-              <a:t> = DeleteMin(</a:t>
-            </a:r>
-            <a:r>
-              <a:t>Q</a:t>
-            </a:r>
-            <a:r>
-              <a:rPr>
-                <a:latin typeface="Gill Sans MT"/>
-                <a:ea typeface="Gill Sans MT"/>
-                <a:cs typeface="Gill Sans MT"/>
-                <a:sym typeface="Gill Sans MT"/>
-              </a:rPr>
-              <a:t>)  //time implememtation based</a:t>
-            </a:r>
-            <a:endParaRPr>
-              <a:latin typeface="Gill Sans MT"/>
-              <a:ea typeface="Gill Sans MT"/>
-              <a:cs typeface="Gill Sans MT"/>
-              <a:sym typeface="Gill Sans MT"/>
-            </a:endParaRPr>
-          </a:p>
-          <a:p>
-            <a:pPr lvl="4" marL="0" indent="914400">
+              <a:t>Reverse the direction of all edges.</a:t>
+            </a:r>
+          </a:p>
+          <a:p>
+            <a:pPr lvl="1" marL="671512" indent="-276225">
               <a:spcBef>
-                <a:spcPts val="200"/>
+                <a:spcPts val="700"/>
               </a:spcBef>
-              <a:buSzTx/>
-              <a:buNone/>
-              <a:defRPr>
-                <a:latin typeface="Courier New"/>
-                <a:ea typeface="Courier New"/>
-                <a:cs typeface="Courier New"/>
-                <a:sym typeface="Courier New"/>
-              </a:defRPr>
+              <a:defRPr sz="2900"/>
             </a:pPr>
             <a:r>
-              <a:t>V</a:t>
-            </a:r>
-            <a:r>
-              <a:rPr baseline="-5999"/>
-              <a:t>T</a:t>
-            </a:r>
-            <a:r>
-              <a:t>= V</a:t>
-            </a:r>
-            <a:r>
-              <a:rPr baseline="-5999"/>
-              <a:t>T </a:t>
-            </a:r>
-            <a:r>
-              <a:t>∪{u}</a:t>
-            </a:r>
-          </a:p>
-          <a:p>
-            <a:pPr lvl="4" marL="0" indent="914400">
+              <a:t>Start from the destination vertex as source</a:t>
+            </a:r>
+          </a:p>
+          <a:p>
+            <a:pPr lvl="1" marL="671512" indent="-276225">
               <a:spcBef>
-                <a:spcPts val="200"/>
+                <a:spcPts val="700"/>
               </a:spcBef>
-              <a:buSzTx/>
-              <a:buNone/>
-              <a:defRPr>
-                <a:latin typeface="Courier New"/>
-                <a:ea typeface="Courier New"/>
-                <a:cs typeface="Courier New"/>
-                <a:sym typeface="Courier New"/>
-              </a:defRPr>
+              <a:defRPr sz="2900"/>
             </a:pPr>
             <a:r>
-              <a:rPr>
-                <a:latin typeface="Gill Sans MT"/>
-                <a:ea typeface="Gill Sans MT"/>
-                <a:cs typeface="Gill Sans MT"/>
-                <a:sym typeface="Gill Sans MT"/>
-              </a:rPr>
-              <a:t>for every vertex </a:t>
-            </a:r>
-            <a:r>
-              <a:t>w∈V-V</a:t>
-            </a:r>
-            <a:r>
-              <a:rPr baseline="-5999"/>
-              <a:t>T</a:t>
-            </a:r>
-            <a:r>
-              <a:rPr>
-                <a:latin typeface="Gill Sans MT"/>
-                <a:ea typeface="Gill Sans MT"/>
-                <a:cs typeface="Gill Sans MT"/>
-                <a:sym typeface="Gill Sans MT"/>
-              </a:rPr>
-              <a:t> adjacent to </a:t>
-            </a:r>
-            <a:r>
-              <a:t>w</a:t>
-            </a:r>
-            <a:r>
-              <a:rPr>
-                <a:latin typeface="Gill Sans MT"/>
-                <a:ea typeface="Gill Sans MT"/>
-                <a:cs typeface="Gill Sans MT"/>
-                <a:sym typeface="Gill Sans MT"/>
-              </a:rPr>
-              <a:t>, do</a:t>
-            </a:r>
-            <a:endParaRPr>
-              <a:latin typeface="Gill Sans MT"/>
-              <a:ea typeface="Gill Sans MT"/>
-              <a:cs typeface="Gill Sans MT"/>
-              <a:sym typeface="Gill Sans MT"/>
-            </a:endParaRPr>
-          </a:p>
-          <a:p>
-            <a:pPr lvl="6" marL="0" indent="1371600">
+              <a:t>Find the shortest path from this src to all other vertices</a:t>
+            </a:r>
+          </a:p>
+          <a:p>
+            <a:pPr lvl="1" marL="671512" indent="-276225">
               <a:spcBef>
-                <a:spcPts val="200"/>
+                <a:spcPts val="700"/>
               </a:spcBef>
-              <a:buSzTx/>
-              <a:buNone/>
-              <a:defRPr sz="2800">
-                <a:latin typeface="Courier New"/>
-                <a:ea typeface="Courier New"/>
-                <a:cs typeface="Courier New"/>
-                <a:sym typeface="Courier New"/>
-              </a:defRPr>
+              <a:defRPr sz="2900"/>
             </a:pPr>
             <a:r>
-              <a:rPr>
-                <a:latin typeface="Gill Sans MT"/>
-                <a:ea typeface="Gill Sans MT"/>
-                <a:cs typeface="Gill Sans MT"/>
-                <a:sym typeface="Gill Sans MT"/>
-              </a:rPr>
-              <a:t>if </a:t>
-            </a:r>
-            <a:r>
-              <a:t>d</a:t>
-            </a:r>
-            <a:r>
-              <a:rPr baseline="-5999"/>
-              <a:t>u</a:t>
-            </a:r>
-            <a:r>
-              <a:t>+weight(w,u)&lt; d</a:t>
-            </a:r>
-            <a:r>
-              <a:rPr baseline="-5999"/>
-              <a:t>w</a:t>
-            </a:r>
-            <a:r>
-              <a:rPr>
-                <a:latin typeface="Gill Sans MT"/>
-                <a:ea typeface="Gill Sans MT"/>
-                <a:cs typeface="Gill Sans MT"/>
-                <a:sym typeface="Gill Sans MT"/>
-              </a:rPr>
-              <a:t>, then</a:t>
-            </a:r>
-            <a:endParaRPr>
-              <a:latin typeface="Gill Sans MT"/>
-              <a:ea typeface="Gill Sans MT"/>
-              <a:cs typeface="Gill Sans MT"/>
-              <a:sym typeface="Gill Sans MT"/>
-            </a:endParaRPr>
-          </a:p>
-          <a:p>
-            <a:pPr lvl="7" marL="0" indent="1600200">
-              <a:spcBef>
-                <a:spcPts val="200"/>
-              </a:spcBef>
-              <a:buSzTx/>
-              <a:buNone/>
-              <a:defRPr sz="2800">
-                <a:latin typeface="Courier New"/>
-                <a:ea typeface="Courier New"/>
-                <a:cs typeface="Courier New"/>
-                <a:sym typeface="Courier New"/>
-              </a:defRPr>
-            </a:pPr>
-            <a:r>
-              <a:rPr>
-                <a:latin typeface="Gill Sans MT"/>
-                <a:ea typeface="Gill Sans MT"/>
-                <a:cs typeface="Gill Sans MT"/>
-                <a:sym typeface="Gill Sans MT"/>
-              </a:rPr>
-              <a:t>// essentially check the edge to u and not from u.</a:t>
-            </a:r>
-            <a:endParaRPr>
-              <a:latin typeface="Gill Sans MT"/>
-              <a:ea typeface="Gill Sans MT"/>
-              <a:cs typeface="Gill Sans MT"/>
-              <a:sym typeface="Gill Sans MT"/>
-            </a:endParaRPr>
+              <a:t>Reverse the path</a:t>
+            </a:r>
           </a:p>
         </p:txBody>
       </p:sp>
@@ -5946,54 +5740,6 @@
                                           <p:spTgt spid="214">
                                             <p:txEl>
                                               <p:pRg st="9" end="9"/>
-                                            </p:txEl>
-                                          </p:spTgt>
-                                        </p:tgtEl>
-                                        <p:attrNameLst>
-                                          <p:attrName>style.visibility</p:attrName>
-                                        </p:attrNameLst>
-                                      </p:cBhvr>
-                                      <p:to>
-                                        <p:strVal val="visible"/>
-                                      </p:to>
-                                    </p:set>
-                                  </p:childTnLst>
-                                </p:cTn>
-                              </p:par>
-                            </p:childTnLst>
-                          </p:cTn>
-                        </p:par>
-                      </p:childTnLst>
-                    </p:cTn>
-                  </p:par>
-                  <p:par>
-                    <p:cTn id="45" fill="hold">
-                      <p:stCondLst>
-                        <p:cond delay="indefinite"/>
-                      </p:stCondLst>
-                      <p:childTnLst>
-                        <p:par>
-                          <p:cTn id="46" fill="hold">
-                            <p:stCondLst>
-                              <p:cond delay="0"/>
-                            </p:stCondLst>
-                            <p:childTnLst>
-                              <p:par>
-                                <p:cTn id="47" presetClass="entr" nodeType="clickEffect" presetSubtype="0" presetID="1" grpId="1" fill="hold">
-                                  <p:stCondLst>
-                                    <p:cond delay="0"/>
-                                  </p:stCondLst>
-                                  <p:iterate type="el" backwards="0">
-                                    <p:tmAbs val="0"/>
-                                  </p:iterate>
-                                  <p:childTnLst>
-                                    <p:set>
-                                      <p:cBhvr>
-                                        <p:cTn id="48" fill="hold"/>
-                                        <p:tgtEl>
-                                          <p:spTgt spid="214">
-                                            <p:txEl>
-                                              <p:pRg st="10" end="10"/>
                                             </p:txEl>
                                           </p:spTgt>
                                         </p:tgtEl>
@@ -11588,8 +11334,8 @@
         </p:nvSpPr>
         <p:spPr>
           <a:xfrm>
-            <a:off x="8244584" y="3546330"/>
-            <a:ext cx="1028850" cy="673101"/>
+            <a:off x="8244585" y="3546330"/>
+            <a:ext cx="1028849" cy="673101"/>
           </a:xfrm>
           <a:prstGeom prst="rect">
             <a:avLst/>
@@ -11955,8 +11701,8 @@
         </p:nvSpPr>
         <p:spPr>
           <a:xfrm>
-            <a:off x="8112999" y="2881658"/>
-            <a:ext cx="803523" cy="839612"/>
+            <a:off x="8113000" y="2881658"/>
+            <a:ext cx="803522" cy="839612"/>
           </a:xfrm>
           <a:prstGeom prst="ellipse">
             <a:avLst/>
@@ -12127,8 +11873,8 @@
         </p:nvSpPr>
         <p:spPr>
           <a:xfrm>
-            <a:off x="4364796" y="5476754"/>
-            <a:ext cx="1379426" cy="533401"/>
+            <a:off x="4364795" y="5476754"/>
+            <a:ext cx="1379427" cy="533401"/>
           </a:xfrm>
           <a:prstGeom prst="rect">
             <a:avLst/>
@@ -12203,7 +11949,7 @@
         </p:nvSpPr>
         <p:spPr>
           <a:xfrm>
-            <a:off x="7825484" y="3649275"/>
+            <a:off x="7825485" y="3649275"/>
             <a:ext cx="1608064" cy="533401"/>
           </a:xfrm>
           <a:prstGeom prst="rect">
@@ -12280,7 +12026,7 @@
         <p:spPr>
           <a:xfrm flipV="1">
             <a:off x="2011257" y="2447132"/>
-            <a:ext cx="1204259" cy="618316"/>
+            <a:ext cx="1204259" cy="618315"/>
           </a:xfrm>
           <a:prstGeom prst="line">
             <a:avLst/>
@@ -12375,8 +12121,8 @@
         </p:nvSpPr>
         <p:spPr>
           <a:xfrm>
-            <a:off x="1966919" y="3552418"/>
-            <a:ext cx="2727054" cy="1439014"/>
+            <a:off x="1966919" y="3552419"/>
+            <a:ext cx="2727054" cy="1439013"/>
           </a:xfrm>
           <a:prstGeom prst="line">
             <a:avLst/>
@@ -14828,52 +14574,52 @@
       </p:par>
     </p:tnLst>
     <p:bldLst>
+      <p:bldP build="whole" bldLvl="1" animBg="1" rev="0" advAuto="0" spid="111" grpId="34"/>
+      <p:bldP build="whole" bldLvl="1" animBg="1" rev="0" advAuto="0" spid="133" grpId="2"/>
+      <p:bldP build="whole" bldLvl="1" animBg="1" rev="0" advAuto="0" spid="109" grpId="15"/>
+      <p:bldP build="whole" bldLvl="1" animBg="1" rev="0" advAuto="0" spid="137" grpId="8"/>
+      <p:bldP build="whole" bldLvl="1" animBg="1" rev="0" advAuto="0" spid="149" grpId="38"/>
+      <p:bldP build="whole" bldLvl="1" animBg="1" rev="0" advAuto="0" spid="142" grpId="27"/>
+      <p:bldP build="whole" bldLvl="1" animBg="1" rev="0" advAuto="0" spid="137" grpId="13"/>
+      <p:bldP build="whole" bldLvl="1" animBg="1" rev="0" advAuto="0" spid="149" grpId="44"/>
+      <p:bldP build="whole" bldLvl="1" animBg="1" rev="0" advAuto="0" spid="139" grpId="6"/>
+      <p:bldP build="whole" bldLvl="1" animBg="1" rev="0" advAuto="0" spid="112" grpId="20"/>
+      <p:bldP build="whole" bldLvl="1" animBg="1" rev="0" advAuto="0" spid="109" grpId="25"/>
+      <p:bldP build="whole" bldLvl="1" animBg="1" rev="0" advAuto="0" spid="146" grpId="14"/>
+      <p:bldP build="whole" bldLvl="1" animBg="1" rev="0" advAuto="0" spid="108" grpId="29"/>
+      <p:bldP build="whole" bldLvl="1" animBg="1" rev="0" advAuto="0" spid="143" grpId="35"/>
+      <p:bldP build="whole" bldLvl="1" animBg="1" rev="0" advAuto="0" spid="134" grpId="4"/>
+      <p:bldP build="whole" bldLvl="1" animBg="1" rev="0" advAuto="0" spid="152" grpId="36"/>
+      <p:bldP build="whole" bldLvl="1" animBg="1" rev="0" advAuto="0" spid="151" grpId="28"/>
+      <p:bldP build="whole" bldLvl="1" animBg="1" rev="0" advAuto="0" spid="134" grpId="10"/>
+      <p:bldP build="whole" bldLvl="1" animBg="1" rev="0" advAuto="0" spid="146" grpId="24"/>
+      <p:bldP build="whole" bldLvl="1" animBg="1" rev="0" advAuto="0" spid="108" grpId="37"/>
+      <p:bldP build="whole" bldLvl="1" animBg="1" rev="0" advAuto="0" spid="109" grpId="39"/>
+      <p:bldP build="whole" bldLvl="1" animBg="1" rev="0" advAuto="0" spid="108" grpId="43"/>
+      <p:bldP build="whole" bldLvl="1" animBg="1" rev="0" advAuto="0" spid="148" grpId="17"/>
+      <p:bldP build="whole" bldLvl="1" animBg="1" rev="0" advAuto="0" spid="141" grpId="11"/>
+      <p:bldP build="whole" bldLvl="1" animBg="1" rev="0" advAuto="0" spid="135" grpId="3"/>
+      <p:bldP build="whole" bldLvl="1" animBg="1" rev="0" advAuto="0" spid="146" grpId="32"/>
+      <p:bldP build="whole" bldLvl="1" animBg="1" rev="0" advAuto="0" spid="150" grpId="19"/>
+      <p:bldP build="whole" bldLvl="1" animBg="1" rev="0" advAuto="0" spid="153" grpId="42"/>
+      <p:bldP build="whole" bldLvl="1" animBg="1" rev="0" advAuto="0" spid="139" grpId="30"/>
+      <p:bldP build="whole" bldLvl="1" animBg="1" rev="0" advAuto="0" spid="110" grpId="9"/>
+      <p:bldP build="whole" bldLvl="1" animBg="1" rev="0" advAuto="0" spid="154" grpId="46"/>
+      <p:bldP build="whole" bldLvl="1" animBg="1" rev="0" advAuto="0" spid="148" grpId="26"/>
+      <p:bldP build="whole" bldLvl="1" animBg="1" rev="0" advAuto="0" spid="148" grpId="33"/>
+      <p:bldP build="whole" bldLvl="1" animBg="1" rev="0" advAuto="0" spid="111" grpId="12"/>
+      <p:bldP build="whole" bldLvl="1" animBg="1" rev="0" advAuto="0" spid="136" grpId="5"/>
+      <p:bldP build="whole" bldLvl="1" animBg="1" rev="0" advAuto="0" spid="107" grpId="1"/>
+      <p:bldP build="whole" bldLvl="1" animBg="1" rev="0" advAuto="0" spid="147" grpId="41"/>
       <p:bldP build="whole" bldLvl="1" animBg="1" rev="0" advAuto="0" spid="138" grpId="7"/>
-      <p:bldP build="whole" bldLvl="1" animBg="1" rev="0" advAuto="0" spid="146" grpId="14"/>
-      <p:bldP build="whole" bldLvl="1" animBg="1" rev="0" advAuto="0" spid="111" grpId="34"/>
-      <p:bldP build="whole" bldLvl="1" animBg="1" rev="0" advAuto="0" spid="138" grpId="16"/>
-      <p:bldP build="whole" bldLvl="1" animBg="1" rev="0" advAuto="0" spid="146" grpId="24"/>
-      <p:bldP build="whole" bldLvl="1" animBg="1" rev="0" advAuto="0" spid="151" grpId="28"/>
-      <p:bldP build="whole" bldLvl="1" animBg="1" rev="0" advAuto="0" spid="136" grpId="5"/>
-      <p:bldP build="whole" bldLvl="1" animBg="1" rev="0" advAuto="0" spid="109" grpId="15"/>
-      <p:bldP build="whole" bldLvl="1" animBg="1" rev="0" advAuto="0" spid="148" grpId="17"/>
-      <p:bldP build="whole" bldLvl="1" animBg="1" rev="0" advAuto="0" spid="146" grpId="32"/>
-      <p:bldP build="whole" bldLvl="1" animBg="1" rev="0" advAuto="0" spid="153" grpId="42"/>
-      <p:bldP build="whole" bldLvl="1" animBg="1" rev="0" advAuto="0" spid="154" grpId="46"/>
-      <p:bldP build="whole" bldLvl="1" animBg="1" rev="0" advAuto="0" spid="109" grpId="25"/>
-      <p:bldP build="whole" bldLvl="1" animBg="1" rev="0" advAuto="0" spid="108" grpId="29"/>
       <p:bldP build="whole" bldLvl="1" animBg="1" rev="0" advAuto="0" spid="140" grpId="18"/>
       <p:bldP build="whole" bldLvl="1" animBg="1" rev="0" advAuto="0" spid="144" grpId="22"/>
+      <p:bldP build="whole" bldLvl="1" animBg="1" rev="0" advAuto="0" spid="148" grpId="40"/>
+      <p:bldP build="whole" bldLvl="1" animBg="1" rev="0" advAuto="0" spid="111" grpId="23"/>
+      <p:bldP build="whole" bldLvl="1" animBg="1" rev="0" advAuto="0" spid="138" grpId="16"/>
       <p:bldP build="whole" bldLvl="1" animBg="1" rev="0" advAuto="0" spid="136" grpId="21"/>
+      <p:bldP build="whole" bldLvl="1" animBg="1" rev="0" advAuto="0" spid="145" grpId="45"/>
       <p:bldP build="whole" bldLvl="1" animBg="1" rev="0" advAuto="0" spid="149" grpId="31"/>
-      <p:bldP build="whole" bldLvl="1" animBg="1" rev="0" advAuto="0" spid="139" grpId="6"/>
-      <p:bldP build="whole" bldLvl="1" animBg="1" rev="0" advAuto="0" spid="148" grpId="26"/>
-      <p:bldP build="whole" bldLvl="1" animBg="1" rev="0" advAuto="0" spid="133" grpId="2"/>
-      <p:bldP build="whole" bldLvl="1" animBg="1" rev="0" advAuto="0" spid="148" grpId="33"/>
-      <p:bldP build="whole" bldLvl="1" animBg="1" rev="0" advAuto="0" spid="152" grpId="36"/>
-      <p:bldP build="whole" bldLvl="1" animBg="1" rev="0" advAuto="0" spid="108" grpId="37"/>
-      <p:bldP build="whole" bldLvl="1" animBg="1" rev="0" advAuto="0" spid="107" grpId="1"/>
-      <p:bldP build="whole" bldLvl="1" animBg="1" rev="0" advAuto="0" spid="150" grpId="19"/>
-      <p:bldP build="whole" bldLvl="1" animBg="1" rev="0" advAuto="0" spid="149" grpId="38"/>
-      <p:bldP build="whole" bldLvl="1" animBg="1" rev="0" advAuto="0" spid="109" grpId="39"/>
-      <p:bldP build="whole" bldLvl="1" animBg="1" rev="0" advAuto="0" spid="148" grpId="40"/>
-      <p:bldP build="whole" bldLvl="1" animBg="1" rev="0" advAuto="0" spid="108" grpId="43"/>
-      <p:bldP build="whole" bldLvl="1" animBg="1" rev="0" advAuto="0" spid="112" grpId="20"/>
-      <p:bldP build="whole" bldLvl="1" animBg="1" rev="0" advAuto="0" spid="149" grpId="44"/>
-      <p:bldP build="whole" bldLvl="1" animBg="1" rev="0" advAuto="0" spid="143" grpId="35"/>
-      <p:bldP build="whole" bldLvl="1" animBg="1" rev="0" advAuto="0" spid="147" grpId="41"/>
-      <p:bldP build="whole" bldLvl="1" animBg="1" rev="0" advAuto="0" spid="110" grpId="9"/>
-      <p:bldP build="whole" bldLvl="1" animBg="1" rev="0" advAuto="0" spid="139" grpId="30"/>
-      <p:bldP build="whole" bldLvl="1" animBg="1" rev="0" advAuto="0" spid="111" grpId="12"/>
-      <p:bldP build="whole" bldLvl="1" animBg="1" rev="0" advAuto="0" spid="134" grpId="4"/>
-      <p:bldP build="whole" bldLvl="1" animBg="1" rev="0" advAuto="0" spid="141" grpId="11"/>
-      <p:bldP build="whole" bldLvl="1" animBg="1" rev="0" advAuto="0" spid="135" grpId="3"/>
-      <p:bldP build="whole" bldLvl="1" animBg="1" rev="0" advAuto="0" spid="145" grpId="45"/>
-      <p:bldP build="whole" bldLvl="1" animBg="1" rev="0" advAuto="0" spid="137" grpId="8"/>
-      <p:bldP build="whole" bldLvl="1" animBg="1" rev="0" advAuto="0" spid="134" grpId="10"/>
-      <p:bldP build="whole" bldLvl="1" animBg="1" rev="0" advAuto="0" spid="142" grpId="27"/>
-      <p:bldP build="whole" bldLvl="1" animBg="1" rev="0" advAuto="0" spid="137" grpId="13"/>
-      <p:bldP build="whole" bldLvl="1" animBg="1" rev="0" advAuto="0" spid="111" grpId="23"/>
     </p:bldLst>
   </p:timing>
 </p:sld>
@@ -15683,8 +15429,8 @@
         </p:nvSpPr>
         <p:spPr>
           <a:xfrm>
-            <a:off x="4765053" y="4473033"/>
-            <a:ext cx="629894" cy="477413"/>
+            <a:off x="4765052" y="4473033"/>
+            <a:ext cx="629895" cy="477413"/>
           </a:xfrm>
           <a:prstGeom prst="rect">
             <a:avLst/>
@@ -16154,9 +15900,9 @@
       </p:par>
     </p:tnLst>
     <p:bldLst>
+      <p:bldP build="p" bldLvl="5" animBg="1" rev="0" advAuto="0" spid="157" grpId="1"/>
       <p:bldP build="whole" bldLvl="1" animBg="1" rev="0" advAuto="0" spid="174" grpId="3"/>
       <p:bldP build="whole" bldLvl="1" animBg="1" rev="0" advAuto="0" spid="173" grpId="2"/>
-      <p:bldP build="p" bldLvl="5" animBg="1" rev="0" advAuto="0" spid="157" grpId="1"/>
       <p:bldP build="whole" bldLvl="1" animBg="1" rev="0" advAuto="0" spid="175" grpId="4"/>
     </p:bldLst>
   </p:timing>

</xml_diff>